<commit_message>
data driven approach for meeting
</commit_message>
<xml_diff>
--- a/Data Driven Approach (Updated for meeting).pptx
+++ b/Data Driven Approach (Updated for meeting).pptx
@@ -10,9 +10,9 @@
     <p:sldId id="256" r:id="rId4"/>
     <p:sldId id="258" r:id="rId5"/>
     <p:sldId id="271" r:id="rId6"/>
-    <p:sldId id="265" r:id="rId7"/>
-    <p:sldId id="260" r:id="rId8"/>
-    <p:sldId id="261" r:id="rId9"/>
+    <p:sldId id="272" r:id="rId7"/>
+    <p:sldId id="265" r:id="rId8"/>
+    <p:sldId id="260" r:id="rId9"/>
     <p:sldId id="262" r:id="rId10"/>
     <p:sldId id="270" r:id="rId11"/>
     <p:sldId id="269" r:id="rId12"/>
@@ -253,7 +253,7 @@
           <a:p>
             <a:fld id="{AB3FF020-39BA-430B-875B-953F68C33FFF}" type="datetimeFigureOut">
               <a:rPr lang="en-US" smtClean="0"/>
-              <a:t>9/12/2022</a:t>
+              <a:t>9/13/2022</a:t>
             </a:fld>
             <a:endParaRPr lang="en-US"/>
           </a:p>
@@ -423,7 +423,7 @@
           <a:p>
             <a:fld id="{AB3FF020-39BA-430B-875B-953F68C33FFF}" type="datetimeFigureOut">
               <a:rPr lang="en-US" smtClean="0"/>
-              <a:t>9/12/2022</a:t>
+              <a:t>9/13/2022</a:t>
             </a:fld>
             <a:endParaRPr lang="en-US"/>
           </a:p>
@@ -603,7 +603,7 @@
           <a:p>
             <a:fld id="{AB3FF020-39BA-430B-875B-953F68C33FFF}" type="datetimeFigureOut">
               <a:rPr lang="en-US" smtClean="0"/>
-              <a:t>9/12/2022</a:t>
+              <a:t>9/13/2022</a:t>
             </a:fld>
             <a:endParaRPr lang="en-US"/>
           </a:p>
@@ -773,7 +773,7 @@
           <a:p>
             <a:fld id="{AB3FF020-39BA-430B-875B-953F68C33FFF}" type="datetimeFigureOut">
               <a:rPr lang="en-US" smtClean="0"/>
-              <a:t>9/12/2022</a:t>
+              <a:t>9/13/2022</a:t>
             </a:fld>
             <a:endParaRPr lang="en-US"/>
           </a:p>
@@ -1019,7 +1019,7 @@
           <a:p>
             <a:fld id="{AB3FF020-39BA-430B-875B-953F68C33FFF}" type="datetimeFigureOut">
               <a:rPr lang="en-US" smtClean="0"/>
-              <a:t>9/12/2022</a:t>
+              <a:t>9/13/2022</a:t>
             </a:fld>
             <a:endParaRPr lang="en-US"/>
           </a:p>
@@ -1251,7 +1251,7 @@
           <a:p>
             <a:fld id="{AB3FF020-39BA-430B-875B-953F68C33FFF}" type="datetimeFigureOut">
               <a:rPr lang="en-US" smtClean="0"/>
-              <a:t>9/12/2022</a:t>
+              <a:t>9/13/2022</a:t>
             </a:fld>
             <a:endParaRPr lang="en-US"/>
           </a:p>
@@ -1618,7 +1618,7 @@
           <a:p>
             <a:fld id="{AB3FF020-39BA-430B-875B-953F68C33FFF}" type="datetimeFigureOut">
               <a:rPr lang="en-US" smtClean="0"/>
-              <a:t>9/12/2022</a:t>
+              <a:t>9/13/2022</a:t>
             </a:fld>
             <a:endParaRPr lang="en-US"/>
           </a:p>
@@ -1736,7 +1736,7 @@
           <a:p>
             <a:fld id="{AB3FF020-39BA-430B-875B-953F68C33FFF}" type="datetimeFigureOut">
               <a:rPr lang="en-US" smtClean="0"/>
-              <a:t>9/12/2022</a:t>
+              <a:t>9/13/2022</a:t>
             </a:fld>
             <a:endParaRPr lang="en-US"/>
           </a:p>
@@ -1831,7 +1831,7 @@
           <a:p>
             <a:fld id="{AB3FF020-39BA-430B-875B-953F68C33FFF}" type="datetimeFigureOut">
               <a:rPr lang="en-US" smtClean="0"/>
-              <a:t>9/12/2022</a:t>
+              <a:t>9/13/2022</a:t>
             </a:fld>
             <a:endParaRPr lang="en-US"/>
           </a:p>
@@ -2108,7 +2108,7 @@
           <a:p>
             <a:fld id="{AB3FF020-39BA-430B-875B-953F68C33FFF}" type="datetimeFigureOut">
               <a:rPr lang="en-US" smtClean="0"/>
-              <a:t>9/12/2022</a:t>
+              <a:t>9/13/2022</a:t>
             </a:fld>
             <a:endParaRPr lang="en-US"/>
           </a:p>
@@ -2361,7 +2361,7 @@
           <a:p>
             <a:fld id="{AB3FF020-39BA-430B-875B-953F68C33FFF}" type="datetimeFigureOut">
               <a:rPr lang="en-US" smtClean="0"/>
-              <a:t>9/12/2022</a:t>
+              <a:t>9/13/2022</a:t>
             </a:fld>
             <a:endParaRPr lang="en-US"/>
           </a:p>
@@ -2577,7 +2577,7 @@
           <a:p>
             <a:fld id="{AB3FF020-39BA-430B-875B-953F68C33FFF}" type="datetimeFigureOut">
               <a:rPr lang="en-US" smtClean="0"/>
-              <a:t>9/12/2022</a:t>
+              <a:t>9/13/2022</a:t>
             </a:fld>
             <a:endParaRPr lang="en-US"/>
           </a:p>
@@ -4346,11 +4346,7 @@
             <a:pPr algn="ctr"/>
             <a:r>
               <a:rPr lang="en-US" dirty="0" smtClean="0"/>
-              <a:t>Data </a:t>
-            </a:r>
-            <a:r>
-              <a:rPr lang="en-US" dirty="0" smtClean="0"/>
-              <a:t>Preprocessing</a:t>
+              <a:t>Data Preprocessing</a:t>
             </a:r>
           </a:p>
         </p:txBody>
@@ -4803,7 +4799,6 @@
               <a:rPr lang="en-US" dirty="0"/>
               <a:t>Formatting data in tabulated form</a:t>
             </a:r>
-            <a:endParaRPr lang="en-US" dirty="0"/>
           </a:p>
         </p:txBody>
       </p:sp>
@@ -5164,26 +5159,42 @@
                 <a:latin typeface="Times New Roman" panose="02020603050405020304" pitchFamily="18" charset="0"/>
                 <a:cs typeface="Times New Roman" panose="02020603050405020304" pitchFamily="18" charset="0"/>
               </a:rPr>
-              <a:t> To test hypothesis and check assumptions.</a:t>
-            </a:r>
-          </a:p>
-          <a:p>
-            <a:pPr lvl="0"/>
-            <a:endParaRPr lang="en-US" sz="2000" dirty="0" smtClean="0">
+              <a:t> To test hypothesis and check assumptions</a:t>
+            </a:r>
+            <a:r>
+              <a:rPr lang="en-US" sz="2000" dirty="0" smtClean="0">
+                <a:latin typeface="Times New Roman" panose="02020603050405020304" pitchFamily="18" charset="0"/>
+                <a:cs typeface="Times New Roman" panose="02020603050405020304" pitchFamily="18" charset="0"/>
+              </a:rPr>
+              <a:t>.</a:t>
+            </a:r>
+          </a:p>
+          <a:p>
+            <a:pPr marL="0" indent="0">
+              <a:buNone/>
+            </a:pPr>
+            <a:endParaRPr lang="en-US" sz="2000" b="1" dirty="0" smtClean="0">
               <a:latin typeface="Times New Roman" panose="02020603050405020304" pitchFamily="18" charset="0"/>
               <a:cs typeface="Times New Roman" panose="02020603050405020304" pitchFamily="18" charset="0"/>
             </a:endParaRPr>
           </a:p>
           <a:p>
-            <a:pPr marL="0" indent="0" algn="just">
+            <a:pPr marL="0" indent="0">
               <a:buNone/>
             </a:pPr>
             <a:r>
+              <a:rPr lang="en-US" sz="2000" b="1" dirty="0" smtClean="0">
+                <a:latin typeface="Times New Roman" panose="02020603050405020304" pitchFamily="18" charset="0"/>
+                <a:cs typeface="Times New Roman" panose="02020603050405020304" pitchFamily="18" charset="0"/>
+              </a:rPr>
+              <a:t>ASSESSING </a:t>
+            </a:r>
+            <a:r>
               <a:rPr lang="en-US" sz="2000" b="1" dirty="0">
                 <a:latin typeface="Times New Roman" panose="02020603050405020304" pitchFamily="18" charset="0"/>
                 <a:cs typeface="Times New Roman" panose="02020603050405020304" pitchFamily="18" charset="0"/>
               </a:rPr>
-              <a:t>DATA PREPROCESSING:</a:t>
+              <a:t>THE DATA SET TO APPLY APPROPRIATE DATA IMPUTING METHOD:</a:t>
             </a:r>
             <a:endParaRPr lang="en-US" sz="2000" dirty="0">
               <a:latin typeface="Times New Roman" panose="02020603050405020304" pitchFamily="18" charset="0"/>
@@ -5191,94 +5202,38 @@
             </a:endParaRPr>
           </a:p>
           <a:p>
-            <a:pPr algn="just"/>
             <a:r>
               <a:rPr lang="en-US" sz="2000" dirty="0">
                 <a:latin typeface="Times New Roman" panose="02020603050405020304" pitchFamily="18" charset="0"/>
                 <a:cs typeface="Times New Roman" panose="02020603050405020304" pitchFamily="18" charset="0"/>
               </a:rPr>
-              <a:t>Data preprocessing is an integral step in Machine Learning as the quality of data and the usefulness of information directly affects the ability of our model to learn.</a:t>
-            </a:r>
-          </a:p>
-          <a:p>
-            <a:pPr algn="just"/>
+              <a:t>Initially due to smaller data set we can physically observe our data set and apply appropriate data imputation technique.</a:t>
+            </a:r>
+          </a:p>
+          <a:p>
             <a:r>
               <a:rPr lang="en-US" sz="2000" dirty="0">
                 <a:latin typeface="Times New Roman" panose="02020603050405020304" pitchFamily="18" charset="0"/>
                 <a:cs typeface="Times New Roman" panose="02020603050405020304" pitchFamily="18" charset="0"/>
               </a:rPr>
-              <a:t>Therefore, it is extremely important that we preprocess our data before feeding it into our model. </a:t>
-            </a:r>
-          </a:p>
-          <a:p>
-            <a:pPr marL="0" indent="0" algn="just">
-              <a:buNone/>
-            </a:pPr>
-            <a:r>
-              <a:rPr lang="en-US" sz="2000" b="1" dirty="0">
-                <a:latin typeface="Times New Roman" panose="02020603050405020304" pitchFamily="18" charset="0"/>
-                <a:cs typeface="Times New Roman" panose="02020603050405020304" pitchFamily="18" charset="0"/>
-              </a:rPr>
-              <a:t>High quality useful data </a:t>
-            </a:r>
-            <a:r>
-              <a:rPr lang="en-US" sz="2000" b="1" dirty="0">
-                <a:latin typeface="Times New Roman" panose="02020603050405020304" pitchFamily="18" charset="0"/>
-                <a:cs typeface="Times New Roman" panose="02020603050405020304" pitchFamily="18" charset="0"/>
-                <a:sym typeface="Wingdings" panose="05000000000000000000" pitchFamily="2" charset="2"/>
-              </a:rPr>
-              <a:t></a:t>
-            </a:r>
-            <a:r>
-              <a:rPr lang="en-US" sz="2000" b="1" dirty="0">
-                <a:latin typeface="Times New Roman" panose="02020603050405020304" pitchFamily="18" charset="0"/>
-                <a:cs typeface="Times New Roman" panose="02020603050405020304" pitchFamily="18" charset="0"/>
-              </a:rPr>
-              <a:t> better model</a:t>
-            </a:r>
+              <a:t>However, as we move on to bigger data sets, it is practically laborious to observe the entire data physically.</a:t>
+            </a:r>
+          </a:p>
+          <a:p>
             <a:r>
               <a:rPr lang="en-US" sz="2000" dirty="0">
                 <a:latin typeface="Times New Roman" panose="02020603050405020304" pitchFamily="18" charset="0"/>
                 <a:cs typeface="Times New Roman" panose="02020603050405020304" pitchFamily="18" charset="0"/>
               </a:rPr>
-              <a:t> </a:t>
-            </a:r>
-          </a:p>
-          <a:p>
-            <a:pPr algn="just"/>
-            <a:r>
-              <a:rPr lang="en-US" sz="2000" dirty="0">
-                <a:latin typeface="Times New Roman" panose="02020603050405020304" pitchFamily="18" charset="0"/>
-                <a:cs typeface="Times New Roman" panose="02020603050405020304" pitchFamily="18" charset="0"/>
-              </a:rPr>
-              <a:t>There are a range of tools in a data preprocessing process. Each of them are applied on a need based scenario.</a:t>
-            </a:r>
-          </a:p>
-          <a:p>
-            <a:pPr algn="just"/>
-            <a:r>
-              <a:rPr lang="en-US" sz="2000" dirty="0">
-                <a:latin typeface="Times New Roman" panose="02020603050405020304" pitchFamily="18" charset="0"/>
-                <a:cs typeface="Times New Roman" panose="02020603050405020304" pitchFamily="18" charset="0"/>
-              </a:rPr>
-              <a:t>Considering the provided data, we need to initially check for missing/null input values as well as corrupted values. </a:t>
-            </a:r>
-          </a:p>
-          <a:p>
-            <a:pPr algn="just"/>
-            <a:r>
-              <a:rPr lang="en-US" sz="2000" dirty="0">
-                <a:latin typeface="Times New Roman" panose="02020603050405020304" pitchFamily="18" charset="0"/>
-                <a:cs typeface="Times New Roman" panose="02020603050405020304" pitchFamily="18" charset="0"/>
-              </a:rPr>
-              <a:t> It turns out our data set consists of a few missing/null values so we need to deal with it accordingly.</a:t>
-            </a:r>
-          </a:p>
-          <a:p>
-            <a:endParaRPr lang="en-US" sz="2000" dirty="0">
-              <a:latin typeface="Times New Roman" panose="02020603050405020304" pitchFamily="18" charset="0"/>
-              <a:cs typeface="Times New Roman" panose="02020603050405020304" pitchFamily="18" charset="0"/>
-            </a:endParaRPr>
+              <a:t>Therefore, we should be employing exploratory data analysis (EDA</a:t>
+            </a:r>
+            <a:r>
+              <a:rPr lang="en-US" sz="2000" dirty="0" smtClean="0">
+                <a:latin typeface="Times New Roman" panose="02020603050405020304" pitchFamily="18" charset="0"/>
+                <a:cs typeface="Times New Roman" panose="02020603050405020304" pitchFamily="18" charset="0"/>
+              </a:rPr>
+              <a:t>).</a:t>
+            </a:r>
           </a:p>
         </p:txBody>
       </p:sp>
@@ -5314,7 +5269,7 @@
       </p:grpSpPr>
       <p:sp>
         <p:nvSpPr>
-          <p:cNvPr id="3" name="Content Placeholder 2"/>
+          <p:cNvPr id="4" name="Content Placeholder 2"/>
           <p:cNvSpPr>
             <a:spLocks noGrp="1"/>
           </p:cNvSpPr>
@@ -5324,13 +5279,13 @@
         </p:nvSpPr>
         <p:spPr>
           <a:xfrm>
-            <a:off x="197708" y="160638"/>
-            <a:ext cx="11156092" cy="6016325"/>
+            <a:off x="160638" y="148281"/>
+            <a:ext cx="11745147" cy="6430939"/>
           </a:xfrm>
         </p:spPr>
         <p:txBody>
           <a:bodyPr>
-            <a:normAutofit/>
+            <a:noAutofit/>
           </a:bodyPr>
           <a:lstStyle/>
           <a:p>
@@ -5338,11 +5293,18 @@
               <a:buNone/>
             </a:pPr>
             <a:r>
+              <a:rPr lang="en-US" sz="2000" b="1" dirty="0" smtClean="0">
+                <a:latin typeface="Times New Roman" panose="02020603050405020304" pitchFamily="18" charset="0"/>
+                <a:cs typeface="Times New Roman" panose="02020603050405020304" pitchFamily="18" charset="0"/>
+              </a:rPr>
+              <a:t>DATA </a:t>
+            </a:r>
+            <a:r>
               <a:rPr lang="en-US" sz="2000" b="1" dirty="0">
                 <a:latin typeface="Times New Roman" panose="02020603050405020304" pitchFamily="18" charset="0"/>
                 <a:cs typeface="Times New Roman" panose="02020603050405020304" pitchFamily="18" charset="0"/>
               </a:rPr>
-              <a:t>FEW METHODS TO HANDLE MISSING/NULL DATA:</a:t>
+              <a:t>PREPROCESSING:</a:t>
             </a:r>
             <a:endParaRPr lang="en-US" sz="2000" dirty="0">
               <a:latin typeface="Times New Roman" panose="02020603050405020304" pitchFamily="18" charset="0"/>
@@ -5356,7 +5318,7 @@
                 <a:latin typeface="Times New Roman" panose="02020603050405020304" pitchFamily="18" charset="0"/>
                 <a:cs typeface="Times New Roman" panose="02020603050405020304" pitchFamily="18" charset="0"/>
               </a:rPr>
-              <a:t>Replacing the missing/null value by mode of the data column (employed in case of categorical features).</a:t>
+              <a:t>Data preprocessing is an integral step in Machine Learning as the quality of data and the usefulness of information directly affects the ability of our model to learn.</a:t>
             </a:r>
           </a:p>
           <a:p>
@@ -5366,7 +5328,41 @@
                 <a:latin typeface="Times New Roman" panose="02020603050405020304" pitchFamily="18" charset="0"/>
                 <a:cs typeface="Times New Roman" panose="02020603050405020304" pitchFamily="18" charset="0"/>
               </a:rPr>
-              <a:t>Replacing the missing/null value by median of the data column in case of outliers.</a:t>
+              <a:t>Therefore, it is extremely important that we preprocess our data before feeding it into our model. </a:t>
+            </a:r>
+          </a:p>
+          <a:p>
+            <a:pPr marL="0" indent="0" algn="just">
+              <a:buNone/>
+            </a:pPr>
+            <a:r>
+              <a:rPr lang="en-US" sz="2000" b="1" dirty="0">
+                <a:latin typeface="Times New Roman" panose="02020603050405020304" pitchFamily="18" charset="0"/>
+                <a:cs typeface="Times New Roman" panose="02020603050405020304" pitchFamily="18" charset="0"/>
+              </a:rPr>
+              <a:t>High quality useful data </a:t>
+            </a:r>
+            <a:r>
+              <a:rPr lang="en-US" sz="2000" b="1" dirty="0">
+                <a:latin typeface="Times New Roman" panose="02020603050405020304" pitchFamily="18" charset="0"/>
+                <a:cs typeface="Times New Roman" panose="02020603050405020304" pitchFamily="18" charset="0"/>
+                <a:sym typeface="Wingdings" panose="05000000000000000000" pitchFamily="2" charset="2"/>
+              </a:rPr>
+              <a:t></a:t>
+            </a:r>
+            <a:r>
+              <a:rPr lang="en-US" sz="2000" b="1" dirty="0">
+                <a:latin typeface="Times New Roman" panose="02020603050405020304" pitchFamily="18" charset="0"/>
+                <a:cs typeface="Times New Roman" panose="02020603050405020304" pitchFamily="18" charset="0"/>
+              </a:rPr>
+              <a:t> better model</a:t>
+            </a:r>
+            <a:r>
+              <a:rPr lang="en-US" sz="2000" dirty="0">
+                <a:latin typeface="Times New Roman" panose="02020603050405020304" pitchFamily="18" charset="0"/>
+                <a:cs typeface="Times New Roman" panose="02020603050405020304" pitchFamily="18" charset="0"/>
+              </a:rPr>
+              <a:t> </a:t>
             </a:r>
           </a:p>
           <a:p>
@@ -5376,7 +5372,7 @@
                 <a:latin typeface="Times New Roman" panose="02020603050405020304" pitchFamily="18" charset="0"/>
                 <a:cs typeface="Times New Roman" panose="02020603050405020304" pitchFamily="18" charset="0"/>
               </a:rPr>
-              <a:t>Replacing the missing/null value by mean. However, mean wouldn't be helpful in case of outliers of the data column.</a:t>
+              <a:t>There are a range of tools in a data preprocessing process. Each of them are applied on a need based scenario.</a:t>
             </a:r>
           </a:p>
           <a:p>
@@ -5386,140 +5382,31 @@
                 <a:latin typeface="Times New Roman" panose="02020603050405020304" pitchFamily="18" charset="0"/>
                 <a:cs typeface="Times New Roman" panose="02020603050405020304" pitchFamily="18" charset="0"/>
               </a:rPr>
-              <a:t>Using forward fill (</a:t>
-            </a:r>
-            <a:r>
-              <a:rPr lang="en-US" sz="2000" dirty="0" err="1">
-                <a:latin typeface="Times New Roman" panose="02020603050405020304" pitchFamily="18" charset="0"/>
-                <a:cs typeface="Times New Roman" panose="02020603050405020304" pitchFamily="18" charset="0"/>
-              </a:rPr>
-              <a:t>ffill</a:t>
-            </a:r>
+              <a:t>Considering the provided data, we need to initially check for missing/null input values as well as corrupted values. </a:t>
+            </a:r>
+          </a:p>
+          <a:p>
+            <a:pPr algn="just"/>
             <a:r>
               <a:rPr lang="en-US" sz="2000" dirty="0">
                 <a:latin typeface="Times New Roman" panose="02020603050405020304" pitchFamily="18" charset="0"/>
                 <a:cs typeface="Times New Roman" panose="02020603050405020304" pitchFamily="18" charset="0"/>
               </a:rPr>
-              <a:t>) method which replaces the null/missing value by the last valid/non-null value in the column.</a:t>
-            </a:r>
-          </a:p>
-          <a:p>
-            <a:pPr algn="just"/>
-            <a:r>
-              <a:rPr lang="en-US" sz="2000" dirty="0">
-                <a:latin typeface="Times New Roman" panose="02020603050405020304" pitchFamily="18" charset="0"/>
-                <a:cs typeface="Times New Roman" panose="02020603050405020304" pitchFamily="18" charset="0"/>
-              </a:rPr>
-              <a:t>Using backward/</a:t>
-            </a:r>
-            <a:r>
-              <a:rPr lang="en-US" sz="2000" dirty="0" err="1">
-                <a:latin typeface="Times New Roman" panose="02020603050405020304" pitchFamily="18" charset="0"/>
-                <a:cs typeface="Times New Roman" panose="02020603050405020304" pitchFamily="18" charset="0"/>
-              </a:rPr>
-              <a:t>backfilll</a:t>
-            </a:r>
-            <a:r>
-              <a:rPr lang="en-US" sz="2000" dirty="0">
-                <a:latin typeface="Times New Roman" panose="02020603050405020304" pitchFamily="18" charset="0"/>
-                <a:cs typeface="Times New Roman" panose="02020603050405020304" pitchFamily="18" charset="0"/>
-              </a:rPr>
-              <a:t> (</a:t>
-            </a:r>
-            <a:r>
-              <a:rPr lang="en-US" sz="2000" dirty="0" err="1">
-                <a:latin typeface="Times New Roman" panose="02020603050405020304" pitchFamily="18" charset="0"/>
-                <a:cs typeface="Times New Roman" panose="02020603050405020304" pitchFamily="18" charset="0"/>
-              </a:rPr>
-              <a:t>bfill</a:t>
-            </a:r>
-            <a:r>
-              <a:rPr lang="en-US" sz="2000" dirty="0">
-                <a:latin typeface="Times New Roman" panose="02020603050405020304" pitchFamily="18" charset="0"/>
-                <a:cs typeface="Times New Roman" panose="02020603050405020304" pitchFamily="18" charset="0"/>
-              </a:rPr>
-              <a:t>) method which replaces the null/missing value by the next valid/non-null value in the column.</a:t>
-            </a:r>
-          </a:p>
-          <a:p>
-            <a:pPr algn="just"/>
-            <a:r>
-              <a:rPr lang="en-US" sz="2000" dirty="0">
-                <a:latin typeface="Times New Roman" panose="02020603050405020304" pitchFamily="18" charset="0"/>
-                <a:cs typeface="Times New Roman" panose="02020603050405020304" pitchFamily="18" charset="0"/>
-              </a:rPr>
-              <a:t>Imputing missing/null values by means of linear, polynomial or quadratic interpolation.</a:t>
-            </a:r>
-          </a:p>
-          <a:p>
-            <a:pPr algn="just"/>
-            <a:r>
-              <a:rPr lang="en-US" sz="2000" dirty="0">
-                <a:latin typeface="Times New Roman" panose="02020603050405020304" pitchFamily="18" charset="0"/>
-                <a:cs typeface="Times New Roman" panose="02020603050405020304" pitchFamily="18" charset="0"/>
-              </a:rPr>
-              <a:t>Using </a:t>
-            </a:r>
-            <a:r>
-              <a:rPr lang="en-US" sz="2000" dirty="0" err="1">
-                <a:latin typeface="Times New Roman" panose="02020603050405020304" pitchFamily="18" charset="0"/>
-                <a:cs typeface="Times New Roman" panose="02020603050405020304" pitchFamily="18" charset="0"/>
-              </a:rPr>
-              <a:t>SimpleImputer</a:t>
-            </a:r>
-            <a:r>
-              <a:rPr lang="en-US" sz="2000" dirty="0">
-                <a:latin typeface="Times New Roman" panose="02020603050405020304" pitchFamily="18" charset="0"/>
-                <a:cs typeface="Times New Roman" panose="02020603050405020304" pitchFamily="18" charset="0"/>
-              </a:rPr>
-              <a:t> of the impute function in Pandas library to impute the missing/null value by the most frequent value in column. This is useful in case of non-numeric values since we can't compute mean, median or mode in such scenarios.</a:t>
-            </a:r>
-          </a:p>
-          <a:p>
-            <a:pPr algn="just"/>
-            <a:r>
-              <a:rPr lang="en-US" sz="2000" dirty="0">
-                <a:latin typeface="Times New Roman" panose="02020603050405020304" pitchFamily="18" charset="0"/>
-                <a:cs typeface="Times New Roman" panose="02020603050405020304" pitchFamily="18" charset="0"/>
-              </a:rPr>
-              <a:t>Deleting the row/column if there are a lot of missing/null values in it. However, this method is not favored as it leads into loss of significant data.</a:t>
-            </a:r>
-          </a:p>
-          <a:p>
-            <a:pPr algn="just"/>
-            <a:r>
-              <a:rPr lang="en-US" sz="2000" dirty="0">
-                <a:latin typeface="Times New Roman" panose="02020603050405020304" pitchFamily="18" charset="0"/>
-                <a:cs typeface="Times New Roman" panose="02020603050405020304" pitchFamily="18" charset="0"/>
-              </a:rPr>
-              <a:t>Creating a separate column for missing/null and treating it as part of the data set.</a:t>
-            </a:r>
-          </a:p>
-          <a:p>
-            <a:pPr lvl="0"/>
+              <a:t> It turns out our data set consists of a few missing/null values so we need to deal with it accordingly.</a:t>
+            </a:r>
+          </a:p>
+          <a:p>
             <a:endParaRPr lang="en-US" sz="2000" dirty="0">
               <a:latin typeface="Times New Roman" panose="02020603050405020304" pitchFamily="18" charset="0"/>
               <a:cs typeface="Times New Roman" panose="02020603050405020304" pitchFamily="18" charset="0"/>
             </a:endParaRPr>
           </a:p>
-          <a:p>
-            <a:pPr marL="0" indent="0">
-              <a:buNone/>
-            </a:pPr>
-            <a:endParaRPr lang="en-US" sz="2000" dirty="0">
-              <a:latin typeface="Times New Roman" panose="02020603050405020304" pitchFamily="18" charset="0"/>
-              <a:cs typeface="Times New Roman" panose="02020603050405020304" pitchFamily="18" charset="0"/>
-            </a:endParaRPr>
-          </a:p>
-          <a:p>
-            <a:endParaRPr lang="en-US" sz="2000" dirty="0"/>
-          </a:p>
         </p:txBody>
       </p:sp>
     </p:spTree>
     <p:extLst>
       <p:ext uri="{BB962C8B-B14F-4D97-AF65-F5344CB8AC3E}">
-        <p14:creationId xmlns:p14="http://schemas.microsoft.com/office/powerpoint/2010/main" val="1955039267"/>
+        <p14:creationId xmlns:p14="http://schemas.microsoft.com/office/powerpoint/2010/main" val="3720751486"/>
       </p:ext>
     </p:extLst>
   </p:cSld>
@@ -5548,7 +5435,7 @@
       </p:grpSpPr>
       <p:sp>
         <p:nvSpPr>
-          <p:cNvPr id="4" name="Content Placeholder 2"/>
+          <p:cNvPr id="3" name="Content Placeholder 2"/>
           <p:cNvSpPr>
             <a:spLocks noGrp="1"/>
           </p:cNvSpPr>
@@ -5558,150 +5445,180 @@
         </p:nvSpPr>
         <p:spPr>
           <a:xfrm>
-            <a:off x="160638" y="148281"/>
-            <a:ext cx="11745147" cy="6430939"/>
+            <a:off x="197708" y="160638"/>
+            <a:ext cx="11156092" cy="6016325"/>
           </a:xfrm>
         </p:spPr>
         <p:txBody>
           <a:bodyPr>
-            <a:noAutofit/>
+            <a:normAutofit/>
           </a:bodyPr>
           <a:lstStyle/>
           <a:p>
-            <a:pPr marL="0" indent="0">
+            <a:pPr marL="0" indent="0" algn="just">
               <a:buNone/>
             </a:pPr>
             <a:r>
-              <a:rPr lang="en-US" sz="2000" b="1" dirty="0" smtClean="0">
-                <a:latin typeface="Times New Roman" panose="02020603050405020304" pitchFamily="18" charset="0"/>
-                <a:cs typeface="Times New Roman" panose="02020603050405020304" pitchFamily="18" charset="0"/>
-              </a:rPr>
-              <a:t>ASSESSING THE DATA SET TO APPLY APPROPRIATE DATA IMPUTING METHOD:</a:t>
-            </a:r>
-            <a:endParaRPr lang="en-US" sz="2000" dirty="0" smtClean="0">
-              <a:latin typeface="Times New Roman" panose="02020603050405020304" pitchFamily="18" charset="0"/>
-              <a:cs typeface="Times New Roman" panose="02020603050405020304" pitchFamily="18" charset="0"/>
-            </a:endParaRPr>
-          </a:p>
-          <a:p>
-            <a:r>
-              <a:rPr lang="en-US" sz="2000" dirty="0" smtClean="0">
-                <a:latin typeface="Times New Roman" panose="02020603050405020304" pitchFamily="18" charset="0"/>
-                <a:cs typeface="Times New Roman" panose="02020603050405020304" pitchFamily="18" charset="0"/>
-              </a:rPr>
-              <a:t>Initially </a:t>
-            </a:r>
-            <a:r>
-              <a:rPr lang="en-US" sz="2000" dirty="0">
-                <a:latin typeface="Times New Roman" panose="02020603050405020304" pitchFamily="18" charset="0"/>
-                <a:cs typeface="Times New Roman" panose="02020603050405020304" pitchFamily="18" charset="0"/>
-              </a:rPr>
-              <a:t>due to smaller data set we can physically observe our data set and apply appropriate data imputation technique.</a:t>
-            </a:r>
-          </a:p>
-          <a:p>
-            <a:r>
-              <a:rPr lang="en-US" sz="2000" dirty="0">
-                <a:latin typeface="Times New Roman" panose="02020603050405020304" pitchFamily="18" charset="0"/>
-                <a:cs typeface="Times New Roman" panose="02020603050405020304" pitchFamily="18" charset="0"/>
-              </a:rPr>
-              <a:t>However, as we move on to bigger data sets, it is practically laborious to observe the entire data physically.</a:t>
-            </a:r>
-          </a:p>
-          <a:p>
-            <a:r>
-              <a:rPr lang="en-US" sz="2000" dirty="0">
-                <a:latin typeface="Times New Roman" panose="02020603050405020304" pitchFamily="18" charset="0"/>
-                <a:cs typeface="Times New Roman" panose="02020603050405020304" pitchFamily="18" charset="0"/>
-              </a:rPr>
-              <a:t>Therefore, we should be employing exploratory data analysis (EDA</a:t>
-            </a:r>
-            <a:r>
-              <a:rPr lang="en-US" sz="2000" dirty="0" smtClean="0">
-                <a:latin typeface="Times New Roman" panose="02020603050405020304" pitchFamily="18" charset="0"/>
-                <a:cs typeface="Times New Roman" panose="02020603050405020304" pitchFamily="18" charset="0"/>
-              </a:rPr>
-              <a:t>).</a:t>
-            </a:r>
-          </a:p>
-          <a:p>
+              <a:rPr lang="en-US" sz="2000" b="1" dirty="0">
+                <a:latin typeface="Times New Roman" panose="02020603050405020304" pitchFamily="18" charset="0"/>
+                <a:cs typeface="Times New Roman" panose="02020603050405020304" pitchFamily="18" charset="0"/>
+              </a:rPr>
+              <a:t>FEW METHODS TO HANDLE MISSING/NULL DATA:</a:t>
+            </a:r>
             <a:endParaRPr lang="en-US" sz="2000" dirty="0">
               <a:latin typeface="Times New Roman" panose="02020603050405020304" pitchFamily="18" charset="0"/>
               <a:cs typeface="Times New Roman" panose="02020603050405020304" pitchFamily="18" charset="0"/>
             </a:endParaRPr>
           </a:p>
           <a:p>
-            <a:pPr marL="0" indent="0">
-              <a:buNone/>
-            </a:pPr>
-            <a:r>
-              <a:rPr lang="en-US" sz="2000" b="1" dirty="0">
-                <a:latin typeface="Times New Roman" panose="02020603050405020304" pitchFamily="18" charset="0"/>
-                <a:cs typeface="Times New Roman" panose="02020603050405020304" pitchFamily="18" charset="0"/>
-              </a:rPr>
-              <a:t>FEATURE SELECTION</a:t>
-            </a:r>
-          </a:p>
-          <a:p>
-            <a:pPr marL="0" indent="0">
-              <a:buNone/>
-            </a:pPr>
-            <a:r>
-              <a:rPr lang="en-US" sz="2000" b="1" dirty="0">
-                <a:latin typeface="Times New Roman" panose="02020603050405020304" pitchFamily="18" charset="0"/>
-                <a:cs typeface="Times New Roman" panose="02020603050405020304" pitchFamily="18" charset="0"/>
-              </a:rPr>
-              <a:t>FISHER’S EXACT TEST:</a:t>
-            </a:r>
-          </a:p>
-          <a:p>
+            <a:pPr algn="just"/>
             <a:r>
               <a:rPr lang="en-US" sz="2000" dirty="0">
                 <a:latin typeface="Times New Roman" panose="02020603050405020304" pitchFamily="18" charset="0"/>
                 <a:cs typeface="Times New Roman" panose="02020603050405020304" pitchFamily="18" charset="0"/>
               </a:rPr>
-              <a:t>Fisher's Exact Test is used </a:t>
-            </a:r>
-            <a:r>
-              <a:rPr lang="en-US" sz="2000" b="1" dirty="0">
-                <a:latin typeface="Times New Roman" panose="02020603050405020304" pitchFamily="18" charset="0"/>
-                <a:cs typeface="Times New Roman" panose="02020603050405020304" pitchFamily="18" charset="0"/>
-              </a:rPr>
-              <a:t>to determine whether or not there is a significant association between two categorical variables</a:t>
-            </a:r>
+              <a:t>Replacing the missing/null value by mode of the data column (employed in case of categorical features).</a:t>
+            </a:r>
+          </a:p>
+          <a:p>
+            <a:pPr algn="just"/>
             <a:r>
               <a:rPr lang="en-US" sz="2000" dirty="0">
                 <a:latin typeface="Times New Roman" panose="02020603050405020304" pitchFamily="18" charset="0"/>
                 <a:cs typeface="Times New Roman" panose="02020603050405020304" pitchFamily="18" charset="0"/>
               </a:rPr>
-              <a:t>.</a:t>
-            </a:r>
-          </a:p>
-          <a:p>
+              <a:t>Replacing the missing/null value by median of the data column in case of outliers.</a:t>
+            </a:r>
+          </a:p>
+          <a:p>
+            <a:pPr algn="just"/>
             <a:r>
               <a:rPr lang="en-US" sz="2000" dirty="0">
                 <a:latin typeface="Times New Roman" panose="02020603050405020304" pitchFamily="18" charset="0"/>
                 <a:cs typeface="Times New Roman" panose="02020603050405020304" pitchFamily="18" charset="0"/>
               </a:rPr>
-              <a:t>In present scenario, we will use Fisher Exact Test to determine whether there exists significant association between the features/independent variables obtained from patients data set and dependent variable </a:t>
+              <a:t>Replacing the missing/null value by mean. However, mean wouldn't be helpful in case of outliers of the data column.</a:t>
+            </a:r>
+          </a:p>
+          <a:p>
+            <a:pPr algn="just"/>
+            <a:r>
+              <a:rPr lang="en-US" sz="2000" dirty="0">
+                <a:latin typeface="Times New Roman" panose="02020603050405020304" pitchFamily="18" charset="0"/>
+                <a:cs typeface="Times New Roman" panose="02020603050405020304" pitchFamily="18" charset="0"/>
+              </a:rPr>
+              <a:t>Using forward fill (</a:t>
             </a:r>
             <a:r>
               <a:rPr lang="en-US" sz="2000" dirty="0" err="1">
                 <a:latin typeface="Times New Roman" panose="02020603050405020304" pitchFamily="18" charset="0"/>
                 <a:cs typeface="Times New Roman" panose="02020603050405020304" pitchFamily="18" charset="0"/>
               </a:rPr>
-              <a:t>i</a:t>
+              <a:t>ffill</a:t>
             </a:r>
             <a:r>
               <a:rPr lang="en-US" sz="2000" dirty="0">
                 <a:latin typeface="Times New Roman" panose="02020603050405020304" pitchFamily="18" charset="0"/>
                 <a:cs typeface="Times New Roman" panose="02020603050405020304" pitchFamily="18" charset="0"/>
               </a:rPr>
-              <a:t>. e. Mode of delivery (C-Section or Spontaneous Vaginal Delivery)</a:t>
-            </a:r>
-          </a:p>
-          <a:p>
-            <a:endParaRPr lang="en-US" sz="2000" dirty="0" smtClean="0">
+              <a:t>) method which replaces the null/missing value by the last valid/non-null value in the column.</a:t>
+            </a:r>
+          </a:p>
+          <a:p>
+            <a:pPr algn="just"/>
+            <a:r>
+              <a:rPr lang="en-US" sz="2000" dirty="0">
+                <a:latin typeface="Times New Roman" panose="02020603050405020304" pitchFamily="18" charset="0"/>
+                <a:cs typeface="Times New Roman" panose="02020603050405020304" pitchFamily="18" charset="0"/>
+              </a:rPr>
+              <a:t>Using backward/</a:t>
+            </a:r>
+            <a:r>
+              <a:rPr lang="en-US" sz="2000" dirty="0" err="1">
+                <a:latin typeface="Times New Roman" panose="02020603050405020304" pitchFamily="18" charset="0"/>
+                <a:cs typeface="Times New Roman" panose="02020603050405020304" pitchFamily="18" charset="0"/>
+              </a:rPr>
+              <a:t>backfilll</a:t>
+            </a:r>
+            <a:r>
+              <a:rPr lang="en-US" sz="2000" dirty="0">
+                <a:latin typeface="Times New Roman" panose="02020603050405020304" pitchFamily="18" charset="0"/>
+                <a:cs typeface="Times New Roman" panose="02020603050405020304" pitchFamily="18" charset="0"/>
+              </a:rPr>
+              <a:t> (</a:t>
+            </a:r>
+            <a:r>
+              <a:rPr lang="en-US" sz="2000" dirty="0" err="1">
+                <a:latin typeface="Times New Roman" panose="02020603050405020304" pitchFamily="18" charset="0"/>
+                <a:cs typeface="Times New Roman" panose="02020603050405020304" pitchFamily="18" charset="0"/>
+              </a:rPr>
+              <a:t>bfill</a:t>
+            </a:r>
+            <a:r>
+              <a:rPr lang="en-US" sz="2000" dirty="0">
+                <a:latin typeface="Times New Roman" panose="02020603050405020304" pitchFamily="18" charset="0"/>
+                <a:cs typeface="Times New Roman" panose="02020603050405020304" pitchFamily="18" charset="0"/>
+              </a:rPr>
+              <a:t>) method which replaces the null/missing value by the next valid/non-null value in the column.</a:t>
+            </a:r>
+          </a:p>
+          <a:p>
+            <a:pPr algn="just"/>
+            <a:r>
+              <a:rPr lang="en-US" sz="2000" dirty="0">
+                <a:latin typeface="Times New Roman" panose="02020603050405020304" pitchFamily="18" charset="0"/>
+                <a:cs typeface="Times New Roman" panose="02020603050405020304" pitchFamily="18" charset="0"/>
+              </a:rPr>
+              <a:t>Imputing missing/null values by means of linear, polynomial or quadratic interpolation.</a:t>
+            </a:r>
+          </a:p>
+          <a:p>
+            <a:pPr algn="just"/>
+            <a:r>
+              <a:rPr lang="en-US" sz="2000" dirty="0">
+                <a:latin typeface="Times New Roman" panose="02020603050405020304" pitchFamily="18" charset="0"/>
+                <a:cs typeface="Times New Roman" panose="02020603050405020304" pitchFamily="18" charset="0"/>
+              </a:rPr>
+              <a:t>Using </a:t>
+            </a:r>
+            <a:r>
+              <a:rPr lang="en-US" sz="2000" dirty="0" err="1">
+                <a:latin typeface="Times New Roman" panose="02020603050405020304" pitchFamily="18" charset="0"/>
+                <a:cs typeface="Times New Roman" panose="02020603050405020304" pitchFamily="18" charset="0"/>
+              </a:rPr>
+              <a:t>SimpleImputer</a:t>
+            </a:r>
+            <a:r>
+              <a:rPr lang="en-US" sz="2000" dirty="0">
+                <a:latin typeface="Times New Roman" panose="02020603050405020304" pitchFamily="18" charset="0"/>
+                <a:cs typeface="Times New Roman" panose="02020603050405020304" pitchFamily="18" charset="0"/>
+              </a:rPr>
+              <a:t> of the impute function in Pandas library to impute the missing/null value by the most frequent value in column. This is useful in case of non-numeric values since we can't compute mean, median or mode in such scenarios.</a:t>
+            </a:r>
+          </a:p>
+          <a:p>
+            <a:pPr algn="just"/>
+            <a:r>
+              <a:rPr lang="en-US" sz="2000" dirty="0">
+                <a:latin typeface="Times New Roman" panose="02020603050405020304" pitchFamily="18" charset="0"/>
+                <a:cs typeface="Times New Roman" panose="02020603050405020304" pitchFamily="18" charset="0"/>
+              </a:rPr>
+              <a:t>Deleting the row/column if there are a lot of missing/null values in it. However, this method is not favored as it leads into loss of significant data.</a:t>
+            </a:r>
+          </a:p>
+          <a:p>
+            <a:pPr algn="just"/>
+            <a:r>
+              <a:rPr lang="en-US" sz="2000" dirty="0">
+                <a:latin typeface="Times New Roman" panose="02020603050405020304" pitchFamily="18" charset="0"/>
+                <a:cs typeface="Times New Roman" panose="02020603050405020304" pitchFamily="18" charset="0"/>
+              </a:rPr>
+              <a:t>Creating a separate column for missing/null and treating it as part of the data set.</a:t>
+            </a:r>
+          </a:p>
+          <a:p>
+            <a:pPr lvl="0"/>
+            <a:endParaRPr lang="en-US" sz="2000" dirty="0">
               <a:latin typeface="Times New Roman" panose="02020603050405020304" pitchFamily="18" charset="0"/>
               <a:cs typeface="Times New Roman" panose="02020603050405020304" pitchFamily="18" charset="0"/>
             </a:endParaRPr>
@@ -5716,17 +5633,14 @@
             </a:endParaRPr>
           </a:p>
           <a:p>
-            <a:endParaRPr lang="en-US" sz="2000" dirty="0">
-              <a:latin typeface="Times New Roman" panose="02020603050405020304" pitchFamily="18" charset="0"/>
-              <a:cs typeface="Times New Roman" panose="02020603050405020304" pitchFamily="18" charset="0"/>
-            </a:endParaRPr>
+            <a:endParaRPr lang="en-US" sz="2000" dirty="0"/>
           </a:p>
         </p:txBody>
       </p:sp>
     </p:spTree>
     <p:extLst>
       <p:ext uri="{BB962C8B-B14F-4D97-AF65-F5344CB8AC3E}">
-        <p14:creationId xmlns:p14="http://schemas.microsoft.com/office/powerpoint/2010/main" val="3776816961"/>
+        <p14:creationId xmlns:p14="http://schemas.microsoft.com/office/powerpoint/2010/main" val="1955039267"/>
       </p:ext>
     </p:extLst>
   </p:cSld>
@@ -5765,8 +5679,8 @@
         </p:nvSpPr>
         <p:spPr>
           <a:xfrm>
-            <a:off x="286215" y="247135"/>
-            <a:ext cx="11619570" cy="6344442"/>
+            <a:off x="160638" y="148281"/>
+            <a:ext cx="11745147" cy="6430939"/>
           </a:xfrm>
         </p:spPr>
         <p:txBody>
@@ -5790,7 +5704,90 @@
                 <a:latin typeface="Times New Roman" panose="02020603050405020304" pitchFamily="18" charset="0"/>
                 <a:cs typeface="Times New Roman" panose="02020603050405020304" pitchFamily="18" charset="0"/>
               </a:rPr>
-              <a:t>ENGINEERING</a:t>
+              <a:t>SELECTION</a:t>
+            </a:r>
+          </a:p>
+          <a:p>
+            <a:pPr marL="0" indent="0">
+              <a:buNone/>
+            </a:pPr>
+            <a:r>
+              <a:rPr lang="en-US" sz="2000" b="1" dirty="0">
+                <a:latin typeface="Times New Roman" panose="02020603050405020304" pitchFamily="18" charset="0"/>
+                <a:cs typeface="Times New Roman" panose="02020603050405020304" pitchFamily="18" charset="0"/>
+              </a:rPr>
+              <a:t>FISHER’S EXACT TEST:</a:t>
+            </a:r>
+          </a:p>
+          <a:p>
+            <a:r>
+              <a:rPr lang="en-US" sz="2000" dirty="0">
+                <a:latin typeface="Times New Roman" panose="02020603050405020304" pitchFamily="18" charset="0"/>
+                <a:cs typeface="Times New Roman" panose="02020603050405020304" pitchFamily="18" charset="0"/>
+              </a:rPr>
+              <a:t>Fisher's Exact Test is used </a:t>
+            </a:r>
+            <a:r>
+              <a:rPr lang="en-US" sz="2000" b="1" dirty="0">
+                <a:latin typeface="Times New Roman" panose="02020603050405020304" pitchFamily="18" charset="0"/>
+                <a:cs typeface="Times New Roman" panose="02020603050405020304" pitchFamily="18" charset="0"/>
+              </a:rPr>
+              <a:t>to determine whether or not there is a significant association between two categorical variables</a:t>
+            </a:r>
+            <a:r>
+              <a:rPr lang="en-US" sz="2000" dirty="0">
+                <a:latin typeface="Times New Roman" panose="02020603050405020304" pitchFamily="18" charset="0"/>
+                <a:cs typeface="Times New Roman" panose="02020603050405020304" pitchFamily="18" charset="0"/>
+              </a:rPr>
+              <a:t>.</a:t>
+            </a:r>
+          </a:p>
+          <a:p>
+            <a:r>
+              <a:rPr lang="en-US" sz="2000" dirty="0">
+                <a:latin typeface="Times New Roman" panose="02020603050405020304" pitchFamily="18" charset="0"/>
+                <a:cs typeface="Times New Roman" panose="02020603050405020304" pitchFamily="18" charset="0"/>
+              </a:rPr>
+              <a:t>In present scenario, we will use Fisher Exact Test to determine whether there exists significant association between the features/independent variables obtained from patients data set and dependent variable </a:t>
+            </a:r>
+            <a:r>
+              <a:rPr lang="en-US" sz="2000" dirty="0" err="1">
+                <a:latin typeface="Times New Roman" panose="02020603050405020304" pitchFamily="18" charset="0"/>
+                <a:cs typeface="Times New Roman" panose="02020603050405020304" pitchFamily="18" charset="0"/>
+              </a:rPr>
+              <a:t>i</a:t>
+            </a:r>
+            <a:r>
+              <a:rPr lang="en-US" sz="2000" dirty="0">
+                <a:latin typeface="Times New Roman" panose="02020603050405020304" pitchFamily="18" charset="0"/>
+                <a:cs typeface="Times New Roman" panose="02020603050405020304" pitchFamily="18" charset="0"/>
+              </a:rPr>
+              <a:t>. e. Mode of delivery (C-Section or Spontaneous Vaginal Delivery</a:t>
+            </a:r>
+            <a:r>
+              <a:rPr lang="en-US" sz="2000" dirty="0" smtClean="0">
+                <a:latin typeface="Times New Roman" panose="02020603050405020304" pitchFamily="18" charset="0"/>
+                <a:cs typeface="Times New Roman" panose="02020603050405020304" pitchFamily="18" charset="0"/>
+              </a:rPr>
+              <a:t>).</a:t>
+            </a:r>
+          </a:p>
+          <a:p>
+            <a:endParaRPr lang="en-US" sz="2000" dirty="0">
+              <a:latin typeface="Times New Roman" panose="02020603050405020304" pitchFamily="18" charset="0"/>
+              <a:cs typeface="Times New Roman" panose="02020603050405020304" pitchFamily="18" charset="0"/>
+            </a:endParaRPr>
+          </a:p>
+          <a:p>
+            <a:pPr marL="0" indent="0">
+              <a:buNone/>
+            </a:pPr>
+            <a:r>
+              <a:rPr lang="en-US" sz="2000" b="1" dirty="0">
+                <a:latin typeface="Times New Roman" panose="02020603050405020304" pitchFamily="18" charset="0"/>
+                <a:cs typeface="Times New Roman" panose="02020603050405020304" pitchFamily="18" charset="0"/>
+              </a:rPr>
+              <a:t>FEATURE ENGINEERING</a:t>
             </a:r>
           </a:p>
           <a:p>
@@ -5842,65 +5839,17 @@
                 <a:latin typeface="Times New Roman" panose="02020603050405020304" pitchFamily="18" charset="0"/>
                 <a:cs typeface="Times New Roman" panose="02020603050405020304" pitchFamily="18" charset="0"/>
               </a:rPr>
-              <a:t> In short we are simplifying our expansive and intricate data set in order to data analysis much easier and faster for machine learning algorithms without extraneous variables to process</a:t>
-            </a:r>
-            <a:r>
-              <a:rPr lang="en-US" sz="2000" dirty="0" smtClean="0">
-                <a:solidFill>
-                  <a:srgbClr val="3A3B41"/>
-                </a:solidFill>
-                <a:latin typeface="Times New Roman" panose="02020603050405020304" pitchFamily="18" charset="0"/>
-                <a:cs typeface="Times New Roman" panose="02020603050405020304" pitchFamily="18" charset="0"/>
-              </a:rPr>
-              <a:t>.</a:t>
-            </a:r>
-          </a:p>
-          <a:p>
-            <a:pPr marL="0" lvl="0" indent="0">
-              <a:buNone/>
-            </a:pPr>
-            <a:endParaRPr lang="en-US" sz="2000" b="1" dirty="0" smtClean="0">
-              <a:latin typeface="Times New Roman" panose="02020603050405020304" pitchFamily="18" charset="0"/>
-              <a:cs typeface="Times New Roman" panose="02020603050405020304" pitchFamily="18" charset="0"/>
-            </a:endParaRPr>
-          </a:p>
-          <a:p>
-            <a:pPr marL="0" lvl="0" indent="0">
-              <a:buNone/>
-            </a:pPr>
-            <a:r>
-              <a:rPr lang="en-US" sz="2000" b="1" dirty="0" smtClean="0">
-                <a:latin typeface="Times New Roman" panose="02020603050405020304" pitchFamily="18" charset="0"/>
-                <a:cs typeface="Times New Roman" panose="02020603050405020304" pitchFamily="18" charset="0"/>
-              </a:rPr>
-              <a:t>LOGISTIC </a:t>
-            </a:r>
-            <a:r>
-              <a:rPr lang="en-US" sz="2000" b="1" dirty="0">
-                <a:latin typeface="Times New Roman" panose="02020603050405020304" pitchFamily="18" charset="0"/>
-                <a:cs typeface="Times New Roman" panose="02020603050405020304" pitchFamily="18" charset="0"/>
-              </a:rPr>
-              <a:t>REGRESSION:</a:t>
-            </a:r>
+              <a:t> In short we are simplifying our expansive and intricate data set in order to data analysis much easier and faster for machine learning algorithms without extraneous variables to process.</a:t>
+            </a:r>
+          </a:p>
+          <a:p>
             <a:endParaRPr lang="en-US" sz="2000" dirty="0">
               <a:latin typeface="Times New Roman" panose="02020603050405020304" pitchFamily="18" charset="0"/>
               <a:cs typeface="Times New Roman" panose="02020603050405020304" pitchFamily="18" charset="0"/>
             </a:endParaRPr>
           </a:p>
           <a:p>
-            <a:r>
-              <a:rPr lang="en-US" sz="2000" dirty="0">
-                <a:latin typeface="Times New Roman" panose="02020603050405020304" pitchFamily="18" charset="0"/>
-                <a:cs typeface="Times New Roman" panose="02020603050405020304" pitchFamily="18" charset="0"/>
-              </a:rPr>
-              <a:t>As discussed initially, we are employing Logistic Regression model based on the numerous pre-birth parameters acquired from various maternity clinics to determine whether or not to perform C-section.</a:t>
-            </a:r>
-          </a:p>
-          <a:p>
-            <a:pPr marL="0" indent="0">
-              <a:buNone/>
-            </a:pPr>
-            <a:endParaRPr lang="en-US" sz="2000" b="1" dirty="0">
+            <a:endParaRPr lang="en-US" sz="2000" dirty="0" smtClean="0">
               <a:latin typeface="Times New Roman" panose="02020603050405020304" pitchFamily="18" charset="0"/>
               <a:cs typeface="Times New Roman" panose="02020603050405020304" pitchFamily="18" charset="0"/>
             </a:endParaRPr>
@@ -5909,53 +5858,23 @@
             <a:pPr marL="0" indent="0">
               <a:buNone/>
             </a:pPr>
-            <a:r>
-              <a:rPr lang="en-US" sz="2000" b="1" dirty="0">
-                <a:latin typeface="Times New Roman" panose="02020603050405020304" pitchFamily="18" charset="0"/>
-                <a:cs typeface="Times New Roman" panose="02020603050405020304" pitchFamily="18" charset="0"/>
-              </a:rPr>
-              <a:t>COMPARISON OF PREDICTED RESULTS WITH OBSERVED/ACTUAL OUTCOMES:</a:t>
-            </a:r>
-          </a:p>
-          <a:p>
-            <a:r>
-              <a:rPr lang="en-US" sz="2000" dirty="0">
-                <a:latin typeface="Times New Roman" panose="02020603050405020304" pitchFamily="18" charset="0"/>
-                <a:cs typeface="Times New Roman" panose="02020603050405020304" pitchFamily="18" charset="0"/>
-              </a:rPr>
-              <a:t>Once we are done fitting Logistic Regression model, we will proceed on to making comparisons.</a:t>
-            </a:r>
-          </a:p>
-          <a:p>
-            <a:r>
-              <a:rPr lang="en-US" sz="2000" dirty="0">
-                <a:latin typeface="Times New Roman" panose="02020603050405020304" pitchFamily="18" charset="0"/>
-                <a:cs typeface="Times New Roman" panose="02020603050405020304" pitchFamily="18" charset="0"/>
-              </a:rPr>
-              <a:t>We will start off by comparing the results by means of Logistic Regression (related to mode of delivery to) to the mode of delivery practiced in real life.</a:t>
-            </a:r>
-          </a:p>
-          <a:p>
-            <a:pPr marL="0" indent="0">
-              <a:buNone/>
-            </a:pPr>
-            <a:endParaRPr lang="en-US" sz="2000" b="1" dirty="0">
-              <a:latin typeface="Times New Roman" panose="02020603050405020304" pitchFamily="18" charset="0"/>
-              <a:cs typeface="Times New Roman" panose="02020603050405020304" pitchFamily="18" charset="0"/>
-            </a:endParaRPr>
-          </a:p>
-          <a:p>
             <a:endParaRPr lang="en-US" sz="2000" dirty="0">
               <a:latin typeface="Times New Roman" panose="02020603050405020304" pitchFamily="18" charset="0"/>
               <a:cs typeface="Times New Roman" panose="02020603050405020304" pitchFamily="18" charset="0"/>
             </a:endParaRPr>
           </a:p>
+          <a:p>
+            <a:endParaRPr lang="en-US" sz="2000" dirty="0">
+              <a:latin typeface="Times New Roman" panose="02020603050405020304" pitchFamily="18" charset="0"/>
+              <a:cs typeface="Times New Roman" panose="02020603050405020304" pitchFamily="18" charset="0"/>
+            </a:endParaRPr>
+          </a:p>
         </p:txBody>
       </p:sp>
     </p:spTree>
     <p:extLst>
       <p:ext uri="{BB962C8B-B14F-4D97-AF65-F5344CB8AC3E}">
-        <p14:creationId xmlns:p14="http://schemas.microsoft.com/office/powerpoint/2010/main" val="536960681"/>
+        <p14:creationId xmlns:p14="http://schemas.microsoft.com/office/powerpoint/2010/main" val="3776816961"/>
       </p:ext>
     </p:extLst>
   </p:cSld>

</xml_diff>